<commit_message>
minor updates to poster @c-roiger
</commit_message>
<xml_diff>
--- a/Project Components/Roiger NEON Intern Poster v.2.pptx
+++ b/Project Components/Roiger NEON Intern Poster v.2.pptx
@@ -2301,7 +2301,14 @@
                 <a:latin typeface="Arial"/>
                 <a:cs typeface="Arial"/>
               </a:rPr>
-              <a:t>Used a function that called NEON APIs to obtain location data</a:t>
+              <a:t>Use </a:t>
+            </a:r>
+            <a:r>
+              <a:rPr lang="en-US" sz="2400" dirty="0" smtClean="0">
+                <a:latin typeface="Arial"/>
+                <a:cs typeface="Arial"/>
+              </a:rPr>
+              <a:t>a function that called NEON APIs to obtain location data</a:t>
             </a:r>
           </a:p>
           <a:p>
@@ -2369,7 +2376,7 @@
                 <a:latin typeface="Arial"/>
                 <a:cs typeface="Arial"/>
               </a:rPr>
-              <a:t>Counted </a:t>
+              <a:t>Count </a:t>
             </a:r>
             <a:r>
               <a:rPr lang="en-US" sz="2400" dirty="0">
@@ -2427,14 +2434,35 @@
                 <a:latin typeface="Arial"/>
                 <a:cs typeface="Arial"/>
               </a:rPr>
-              <a:t>Created a temperature lag </a:t>
+              <a:t>Create </a:t>
+            </a:r>
+            <a:r>
+              <a:rPr lang="en-US" sz="2400" dirty="0" smtClean="0">
+                <a:latin typeface="Arial"/>
+                <a:cs typeface="Arial"/>
+              </a:rPr>
+              <a:t>a temperature lag </a:t>
             </a:r>
             <a:r>
               <a:rPr lang="en-US" sz="2400" dirty="0">
                 <a:latin typeface="Arial"/>
                 <a:cs typeface="Arial"/>
               </a:rPr>
-              <a:t>function that calculated the average maximum temperature </a:t>
+              <a:t>function that </a:t>
+            </a:r>
+            <a:r>
+              <a:rPr lang="en-US" sz="2400" dirty="0" smtClean="0">
+                <a:latin typeface="Arial"/>
+                <a:cs typeface="Arial"/>
+              </a:rPr>
+              <a:t>calculates </a:t>
+            </a:r>
+            <a:r>
+              <a:rPr lang="en-US" sz="2400" dirty="0">
+                <a:latin typeface="Arial"/>
+                <a:cs typeface="Arial"/>
+              </a:rPr>
+              <a:t>the average maximum temperature </a:t>
             </a:r>
             <a:r>
               <a:rPr lang="en-US" sz="2400" dirty="0" smtClean="0">
@@ -2478,7 +2506,17 @@
                 <a:latin typeface="Arial"/>
                 <a:cs typeface="Arial"/>
               </a:rPr>
-              <a:t>Applied the temperature lag function to a species richness data frame using the ‘</a:t>
+              <a:t>Apply </a:t>
+            </a:r>
+            <a:r>
+              <a:rPr lang="en-US" sz="2400" dirty="0" smtClean="0">
+                <a:solidFill>
+                  <a:schemeClr val="tx1"/>
+                </a:solidFill>
+                <a:latin typeface="Arial"/>
+                <a:cs typeface="Arial"/>
+              </a:rPr>
+              <a:t>the temperature lag function to a species richness data frame using the ‘</a:t>
             </a:r>
             <a:r>
               <a:rPr lang="en-US" sz="2400" dirty="0" err="1" smtClean="0">
@@ -3847,11 +3885,7 @@
             <a:p>
               <a:r>
                 <a:rPr lang="en-US" sz="1800" b="1" dirty="0" smtClean="0"/>
-                <a:t>Figure </a:t>
-              </a:r>
-              <a:r>
-                <a:rPr lang="en-US" sz="1800" b="1" dirty="0" smtClean="0"/>
-                <a:t>4. </a:t>
+                <a:t>Figure 4. </a:t>
               </a:r>
               <a:r>
                 <a:rPr lang="en-US" sz="1800" i="1" dirty="0" err="1" smtClean="0"/>
@@ -5194,7 +5228,7 @@
                 <a:latin typeface="Arial"/>
                 <a:cs typeface="Arial"/>
               </a:rPr>
-              <a:t>tarslais</a:t>
+              <a:t>tarsalis</a:t>
             </a:r>
             <a:r>
               <a:rPr lang="en-US" sz="4800" b="1" i="1" dirty="0" smtClean="0">
@@ -5216,13 +5250,6 @@
               </a:rPr>
               <a:t>has expanded:</a:t>
             </a:r>
-            <a:endParaRPr lang="en-US" sz="4800" b="1" dirty="0" smtClean="0">
-              <a:solidFill>
-                <a:schemeClr val="accent2"/>
-              </a:solidFill>
-              <a:latin typeface="Arial"/>
-              <a:cs typeface="Arial"/>
-            </a:endParaRPr>
           </a:p>
           <a:p>
             <a:pPr marL="457200" indent="-457200">
@@ -5351,7 +5378,21 @@
                 <a:latin typeface="Arial"/>
                 <a:cs typeface="Arial"/>
               </a:rPr>
-              <a:t>was present (bottom) reveal that this species has been found in habitats further north from its typical range.</a:t>
+              <a:t>was present (bottom) reveal that this species has been found in habitats </a:t>
+            </a:r>
+            <a:r>
+              <a:rPr lang="en-US" sz="3400" dirty="0" smtClean="0">
+                <a:latin typeface="Arial"/>
+                <a:cs typeface="Arial"/>
+              </a:rPr>
+              <a:t>farther </a:t>
+            </a:r>
+            <a:r>
+              <a:rPr lang="en-US" sz="3400" dirty="0" smtClean="0">
+                <a:latin typeface="Arial"/>
+                <a:cs typeface="Arial"/>
+              </a:rPr>
+              <a:t>north from its typical range.</a:t>
             </a:r>
           </a:p>
           <a:p>
@@ -5421,11 +5462,7 @@
           <a:p>
             <a:r>
               <a:rPr lang="en-US" sz="1800" b="1" dirty="0" smtClean="0"/>
-              <a:t>Figure </a:t>
-            </a:r>
-            <a:r>
-              <a:rPr lang="en-US" sz="1800" b="1" dirty="0" smtClean="0"/>
-              <a:t>5. </a:t>
+              <a:t>Figure 5. </a:t>
             </a:r>
             <a:r>
               <a:rPr lang="en-US" sz="1800" dirty="0" smtClean="0"/>
@@ -6495,29 +6532,6 @@
 </file>
 
 <file path=customXml/item1.xml><?xml version="1.0" encoding="utf-8"?>
-<p:properties xmlns:p="http://schemas.microsoft.com/office/2006/metadata/properties" xmlns:xsi="http://www.w3.org/2001/XMLSchema-instance" xmlns:pc="http://schemas.microsoft.com/office/infopath/2007/PartnerControls">
-  <documentManagement>
-    <Display_x0020_Category xmlns="eff24bd8-0971-442c-8d07-8938bacad241">Technical Poster Templates</Display_x0020_Category>
-    <Tips xmlns="eff24bd8-0971-442c-8d07-8938bacad241">24x36 (2x3) Horizontal Technical Poster Template
-Contact PMP for design assistance and printing</Tips>
-    <Thumbnail xmlns="eff24bd8-0971-442c-8d07-8938bacad241">
-      <Url>http://my.battelle.org/sites/1204/PublishingImages/24horiz.JPG</Url>
-      <Description xsi:nil="true"/>
-    </Thumbnail>
-  </documentManagement>
-</p:properties>
-</file>
-
-<file path=customXml/item2.xml><?xml version="1.0" encoding="utf-8"?>
-<?mso-contentType ?>
-<FormTemplates xmlns="http://schemas.microsoft.com/sharepoint/v3/contenttype/forms">
-  <Display>DocumentLibraryForm</Display>
-  <Edit>DocumentLibraryForm</Edit>
-  <New>DocumentLibraryForm</New>
-</FormTemplates>
-</file>
-
-<file path=customXml/item3.xml><?xml version="1.0" encoding="utf-8"?>
 <ct:contentTypeSchema xmlns:ct="http://schemas.microsoft.com/office/2006/metadata/contentType" xmlns:ma="http://schemas.microsoft.com/office/2006/metadata/properties/metaAttributes" ct:_="" ma:_="" ma:contentTypeName="Document" ma:contentTypeID="0x010100ED60A9A06E5FED44AC1CDEEE45A76310" ma:contentTypeVersion="4" ma:contentTypeDescription="Create a new document." ma:contentTypeScope="" ma:versionID="074ba561a83d5d4641addf53e66ba534">
   <xsd:schema xmlns:xsd="http://www.w3.org/2001/XMLSchema" xmlns:xs="http://www.w3.org/2001/XMLSchema" xmlns:p="http://schemas.microsoft.com/office/2006/metadata/properties" xmlns:ns1="eff24bd8-0971-442c-8d07-8938bacad241" targetNamespace="http://schemas.microsoft.com/office/2006/metadata/properties" ma:root="true" ma:fieldsID="b1ab2b088810cb506e54576bc1f030ea" ns1:_="">
     <xsd:import namespace="eff24bd8-0971-442c-8d07-8938bacad241"/>
@@ -6667,31 +6681,30 @@
 </ct:contentTypeSchema>
 </file>
 
-<file path=customXml/itemProps1.xml><?xml version="1.0" encoding="utf-8"?>
-<ds:datastoreItem xmlns:ds="http://schemas.openxmlformats.org/officeDocument/2006/customXml" ds:itemID="{9594DFF2-C628-43CC-A584-EA39B3AE16B2}">
-  <ds:schemaRefs>
-    <ds:schemaRef ds:uri="http://purl.org/dc/dcmitype/"/>
-    <ds:schemaRef ds:uri="http://purl.org/dc/elements/1.1/"/>
-    <ds:schemaRef ds:uri="http://schemas.microsoft.com/office/2006/documentManagement/types"/>
-    <ds:schemaRef ds:uri="http://schemas.microsoft.com/office/2006/metadata/properties"/>
-    <ds:schemaRef ds:uri="eff24bd8-0971-442c-8d07-8938bacad241"/>
-    <ds:schemaRef ds:uri="http://schemas.microsoft.com/office/infopath/2007/PartnerControls"/>
-    <ds:schemaRef ds:uri="http://www.w3.org/XML/1998/namespace"/>
-    <ds:schemaRef ds:uri="http://schemas.openxmlformats.org/package/2006/metadata/core-properties"/>
-    <ds:schemaRef ds:uri="http://purl.org/dc/terms/"/>
-  </ds:schemaRefs>
-</ds:datastoreItem>
+<file path=customXml/item2.xml><?xml version="1.0" encoding="utf-8"?>
+<?mso-contentType ?>
+<FormTemplates xmlns="http://schemas.microsoft.com/sharepoint/v3/contenttype/forms">
+  <Display>DocumentLibraryForm</Display>
+  <Edit>DocumentLibraryForm</Edit>
+  <New>DocumentLibraryForm</New>
+</FormTemplates>
 </file>
 
-<file path=customXml/itemProps2.xml><?xml version="1.0" encoding="utf-8"?>
-<ds:datastoreItem xmlns:ds="http://schemas.openxmlformats.org/officeDocument/2006/customXml" ds:itemID="{75DC5EB5-B726-44F2-A2F6-CC75636660BA}">
-  <ds:schemaRefs>
-    <ds:schemaRef ds:uri="http://schemas.microsoft.com/sharepoint/v3/contenttype/forms"/>
-  </ds:schemaRefs>
-</ds:datastoreItem>
+<file path=customXml/item3.xml><?xml version="1.0" encoding="utf-8"?>
+<p:properties xmlns:p="http://schemas.microsoft.com/office/2006/metadata/properties" xmlns:xsi="http://www.w3.org/2001/XMLSchema-instance" xmlns:pc="http://schemas.microsoft.com/office/infopath/2007/PartnerControls">
+  <documentManagement>
+    <Display_x0020_Category xmlns="eff24bd8-0971-442c-8d07-8938bacad241">Technical Poster Templates</Display_x0020_Category>
+    <Tips xmlns="eff24bd8-0971-442c-8d07-8938bacad241">24x36 (2x3) Horizontal Technical Poster Template
+Contact PMP for design assistance and printing</Tips>
+    <Thumbnail xmlns="eff24bd8-0971-442c-8d07-8938bacad241">
+      <Url>http://my.battelle.org/sites/1204/PublishingImages/24horiz.JPG</Url>
+      <Description xsi:nil="true"/>
+    </Thumbnail>
+  </documentManagement>
+</p:properties>
 </file>
 
-<file path=customXml/itemProps3.xml><?xml version="1.0" encoding="utf-8"?>
+<file path=customXml/itemProps1.xml><?xml version="1.0" encoding="utf-8"?>
 <ds:datastoreItem xmlns:ds="http://schemas.openxmlformats.org/officeDocument/2006/customXml" ds:itemID="{712FC097-1BC3-4843-854E-A0F26318B0F2}">
   <ds:schemaRefs>
     <ds:schemaRef ds:uri="http://schemas.microsoft.com/office/2006/metadata/contentType"/>
@@ -6707,4 +6720,28 @@
     <ds:schemaRef ds:uri="http://schemas.microsoft.com/internal/obd"/>
   </ds:schemaRefs>
 </ds:datastoreItem>
+</file>
+
+<file path=customXml/itemProps2.xml><?xml version="1.0" encoding="utf-8"?>
+<ds:datastoreItem xmlns:ds="http://schemas.openxmlformats.org/officeDocument/2006/customXml" ds:itemID="{75DC5EB5-B726-44F2-A2F6-CC75636660BA}">
+  <ds:schemaRefs>
+    <ds:schemaRef ds:uri="http://schemas.microsoft.com/sharepoint/v3/contenttype/forms"/>
+  </ds:schemaRefs>
+</ds:datastoreItem>
+</file>
+
+<file path=customXml/itemProps3.xml><?xml version="1.0" encoding="utf-8"?>
+<ds:datastoreItem xmlns:ds="http://schemas.openxmlformats.org/officeDocument/2006/customXml" ds:itemID="{9594DFF2-C628-43CC-A584-EA39B3AE16B2}">
+  <ds:schemaRefs>
+    <ds:schemaRef ds:uri="http://purl.org/dc/dcmitype/"/>
+    <ds:schemaRef ds:uri="http://purl.org/dc/elements/1.1/"/>
+    <ds:schemaRef ds:uri="http://schemas.microsoft.com/office/2006/documentManagement/types"/>
+    <ds:schemaRef ds:uri="http://schemas.microsoft.com/office/2006/metadata/properties"/>
+    <ds:schemaRef ds:uri="eff24bd8-0971-442c-8d07-8938bacad241"/>
+    <ds:schemaRef ds:uri="http://schemas.microsoft.com/office/infopath/2007/PartnerControls"/>
+    <ds:schemaRef ds:uri="http://www.w3.org/XML/1998/namespace"/>
+    <ds:schemaRef ds:uri="http://schemas.openxmlformats.org/package/2006/metadata/core-properties"/>
+    <ds:schemaRef ds:uri="http://purl.org/dc/terms/"/>
+  </ds:schemaRefs>
+</ds:datastoreItem>
 </file>
</xml_diff>